<commit_message>
2015 2016 dataset clean
</commit_message>
<xml_diff>
--- a/160704 로그분석 - 4.pptx
+++ b/160704 로그분석 - 4.pptx
@@ -8640,7 +8640,7 @@
           <a:p>
             <a:r>
               <a:rPr lang="en-US" altLang="ko-KR" dirty="0" smtClean="0"/>
-              <a:t>2016-04-19</a:t>
+              <a:t>2016-07-04</a:t>
             </a:r>
             <a:endParaRPr lang="ko-KR" altLang="en-US" dirty="0"/>
           </a:p>
@@ -13729,7 +13729,7 @@
           <a:p>
             <a:r>
               <a:rPr lang="en-US" altLang="ko-KR" dirty="0" smtClean="0"/>
-              <a:t>Pre-processing</a:t>
+              <a:t>Dataset</a:t>
             </a:r>
           </a:p>
           <a:p>
@@ -13747,9 +13747,12 @@
           <a:p>
             <a:r>
               <a:rPr lang="en-US" altLang="ko-KR" dirty="0"/>
-              <a:t>Time interval between actions</a:t>
-            </a:r>
-            <a:endParaRPr lang="ko-KR" altLang="en-US" dirty="0"/>
+              <a:t>Time interval between </a:t>
+            </a:r>
+            <a:r>
+              <a:rPr lang="en-US" altLang="ko-KR" dirty="0" smtClean="0"/>
+              <a:t>actions</a:t>
+            </a:r>
           </a:p>
         </p:txBody>
       </p:sp>
@@ -22995,7 +22998,7 @@
           <a:p>
             <a:r>
               <a:rPr lang="en-US" altLang="ko-KR" dirty="0" smtClean="0"/>
-              <a:t>Pre-processing</a:t>
+              <a:t>Entry log dataset</a:t>
             </a:r>
             <a:endParaRPr lang="ko-KR" altLang="en-US" dirty="0"/>
           </a:p>
@@ -23127,6 +23130,18 @@
             <a:r>
               <a:rPr lang="ko-KR" altLang="en-US" dirty="0" smtClean="0"/>
               <a:t> 동안 생긴 로그 데이터</a:t>
+            </a:r>
+            <a:endParaRPr lang="en-US" altLang="ko-KR" dirty="0" smtClean="0"/>
+          </a:p>
+          <a:p>
+            <a:pPr lvl="2"/>
+            <a:r>
+              <a:rPr lang="en-US" altLang="ko-KR" dirty="0" smtClean="0"/>
+              <a:t>2015</a:t>
+            </a:r>
+            <a:r>
+              <a:rPr lang="ko-KR" altLang="en-US" dirty="0" smtClean="0"/>
+              <a:t>년 강의와 동일한 강의</a:t>
             </a:r>
             <a:endParaRPr lang="en-US" altLang="ko-KR" dirty="0" smtClean="0"/>
           </a:p>
@@ -23893,7 +23908,7 @@
         </p:nvSpPr>
         <p:spPr>
           <a:xfrm>
-            <a:off x="3022157" y="4884924"/>
+            <a:off x="5365307" y="4844562"/>
             <a:ext cx="2826194" cy="276999"/>
           </a:xfrm>
           <a:prstGeom prst="rect">
@@ -25063,7 +25078,7 @@
 </file>
 
 <file path=ppt/slides/slide7.xml><?xml version="1.0" encoding="utf-8"?>
-<p:sld xmlns:a="http://schemas.openxmlformats.org/drawingml/2006/main" xmlns:r="http://schemas.openxmlformats.org/officeDocument/2006/relationships" xmlns:p="http://schemas.openxmlformats.org/presentationml/2006/main">
+<p:sld xmlns:a="http://schemas.openxmlformats.org/drawingml/2006/main" xmlns:r="http://schemas.openxmlformats.org/officeDocument/2006/relationships" xmlns:p="http://schemas.openxmlformats.org/presentationml/2006/main" show="0">
   <p:cSld>
     <p:spTree>
       <p:nvGrpSpPr>
@@ -25624,11 +25639,11 @@
   <p:clrMapOvr>
     <a:masterClrMapping/>
   </p:clrMapOvr>
-  <mc:AlternateContent xmlns:mc="http://schemas.openxmlformats.org/markup-compatibility/2006" xmlns:p14="http://schemas.microsoft.com/office/powerpoint/2010/main">
-    <mc:Choice Requires="p14">
+  <mc:AlternateContent xmlns:mc="http://schemas.openxmlformats.org/markup-compatibility/2006">
+    <mc:Choice xmlns:p14="http://schemas.microsoft.com/office/powerpoint/2010/main" Requires="p14">
       <p:transition p14:dur="0"/>
     </mc:Choice>
-    <mc:Fallback xmlns="">
+    <mc:Fallback>
       <p:transition/>
     </mc:Fallback>
   </mc:AlternateContent>
@@ -25741,7 +25756,7 @@
 </file>
 
 <file path=ppt/slides/slide8.xml><?xml version="1.0" encoding="utf-8"?>
-<p:sld xmlns:a="http://schemas.openxmlformats.org/drawingml/2006/main" xmlns:r="http://schemas.openxmlformats.org/officeDocument/2006/relationships" xmlns:p="http://schemas.openxmlformats.org/presentationml/2006/main">
+<p:sld xmlns:a="http://schemas.openxmlformats.org/drawingml/2006/main" xmlns:r="http://schemas.openxmlformats.org/officeDocument/2006/relationships" xmlns:p="http://schemas.openxmlformats.org/presentationml/2006/main" show="0">
   <p:cSld>
     <p:spTree>
       <p:nvGrpSpPr>
@@ -26323,11 +26338,11 @@
   <p:clrMapOvr>
     <a:masterClrMapping/>
   </p:clrMapOvr>
-  <mc:AlternateContent xmlns:mc="http://schemas.openxmlformats.org/markup-compatibility/2006" xmlns:p14="http://schemas.microsoft.com/office/powerpoint/2010/main">
-    <mc:Choice Requires="p14">
+  <mc:AlternateContent xmlns:mc="http://schemas.openxmlformats.org/markup-compatibility/2006">
+    <mc:Choice xmlns:p14="http://schemas.microsoft.com/office/powerpoint/2010/main" Requires="p14">
       <p:transition p14:dur="0"/>
     </mc:Choice>
-    <mc:Fallback xmlns="">
+    <mc:Fallback>
       <p:transition/>
     </mc:Fallback>
   </mc:AlternateContent>

</xml_diff>